<commit_message>
bug in estimate_elastic_line_en (fe_utilities.py) and elastic line position validation.
</commit_message>
<xml_diff>
--- a/Data/sources/reduction/Mantid_nxspe_2024/cycle06_05/EiAndElasticLineForRunsEi200Ei800.pptx
+++ b/Data/sources/reduction/Mantid_nxspe_2024/cycle06_05/EiAndElasticLineForRunsEi200Ei800.pptx
@@ -8,7 +8,8 @@
     <p:sldId id="258" r:id="rId2"/>
     <p:sldId id="260" r:id="rId3"/>
     <p:sldId id="259" r:id="rId4"/>
-    <p:sldId id="257" r:id="rId5"/>
+    <p:sldId id="261" r:id="rId5"/>
+    <p:sldId id="257" r:id="rId6"/>
   </p:sldIdLst>
   <p:sldSz cx="12192000" cy="6858000"/>
   <p:notesSz cx="6858000" cy="9144000"/>
@@ -4600,6 +4601,234 @@
 </file>
 
 <file path=ppt/slides/slide4.xml><?xml version="1.0" encoding="utf-8"?>
+<p:sld xmlns:a="http://schemas.openxmlformats.org/drawingml/2006/main" xmlns:r="http://schemas.openxmlformats.org/officeDocument/2006/relationships" xmlns:p="http://schemas.openxmlformats.org/presentationml/2006/main">
+  <p:cSld>
+    <p:spTree>
+      <p:nvGrpSpPr>
+        <p:cNvPr id="1" name=""/>
+        <p:cNvGrpSpPr/>
+        <p:nvPr/>
+      </p:nvGrpSpPr>
+      <p:grpSpPr>
+        <a:xfrm>
+          <a:off x="0" y="0"/>
+          <a:ext cx="0" cy="0"/>
+          <a:chOff x="0" y="0"/>
+          <a:chExt cx="0" cy="0"/>
+        </a:xfrm>
+      </p:grpSpPr>
+      <p:pic>
+        <p:nvPicPr>
+          <p:cNvPr id="22" name="Picture 21">
+            <a:extLst>
+              <a:ext uri="{FF2B5EF4-FFF2-40B4-BE49-F238E27FC236}">
+                <a16:creationId xmlns:a16="http://schemas.microsoft.com/office/drawing/2014/main" id="{367C4008-5883-23B3-BF9D-53446B5B02B9}"/>
+              </a:ext>
+            </a:extLst>
+          </p:cNvPr>
+          <p:cNvPicPr>
+            <a:picLocks noChangeAspect="1"/>
+          </p:cNvPicPr>
+          <p:nvPr/>
+        </p:nvPicPr>
+        <p:blipFill>
+          <a:blip r:embed="rId2"/>
+          <a:stretch>
+            <a:fillRect/>
+          </a:stretch>
+        </p:blipFill>
+        <p:spPr>
+          <a:xfrm>
+            <a:off x="4271330" y="3492057"/>
+            <a:ext cx="3770098" cy="2880000"/>
+          </a:xfrm>
+          <a:prstGeom prst="rect">
+            <a:avLst/>
+          </a:prstGeom>
+        </p:spPr>
+      </p:pic>
+      <p:sp>
+        <p:nvSpPr>
+          <p:cNvPr id="2" name="Title 1">
+            <a:extLst>
+              <a:ext uri="{FF2B5EF4-FFF2-40B4-BE49-F238E27FC236}">
+                <a16:creationId xmlns:a16="http://schemas.microsoft.com/office/drawing/2014/main" id="{8B0014F4-FF49-3447-89B4-BC3800DB8191}"/>
+              </a:ext>
+            </a:extLst>
+          </p:cNvPr>
+          <p:cNvSpPr>
+            <a:spLocks noGrp="1"/>
+          </p:cNvSpPr>
+          <p:nvPr>
+            <p:ph type="title"/>
+          </p:nvPr>
+        </p:nvSpPr>
+        <p:spPr>
+          <a:xfrm>
+            <a:off x="838200" y="365126"/>
+            <a:ext cx="10515600" cy="491114"/>
+          </a:xfrm>
+        </p:spPr>
+        <p:txBody>
+          <a:bodyPr>
+            <a:normAutofit fontScale="90000"/>
+          </a:bodyPr>
+          <a:lstStyle/>
+          <a:p>
+            <a:r>
+              <a:rPr lang="en-GB" sz="2400" dirty="0"/>
+              <a:t>Validation for elastic line location at small angles (Ei=788meV)  is inconclusive, though may be cautiously explained:</a:t>
+            </a:r>
+          </a:p>
+        </p:txBody>
+      </p:sp>
+      <p:pic>
+        <p:nvPicPr>
+          <p:cNvPr id="7" name="Picture 6">
+            <a:extLst>
+              <a:ext uri="{FF2B5EF4-FFF2-40B4-BE49-F238E27FC236}">
+                <a16:creationId xmlns:a16="http://schemas.microsoft.com/office/drawing/2014/main" id="{49FFBA79-9BB1-7E6C-2596-915546E35A60}"/>
+              </a:ext>
+            </a:extLst>
+          </p:cNvPr>
+          <p:cNvPicPr>
+            <a:picLocks noChangeAspect="1"/>
+          </p:cNvPicPr>
+          <p:nvPr/>
+        </p:nvPicPr>
+        <p:blipFill>
+          <a:blip r:embed="rId3"/>
+          <a:stretch>
+            <a:fillRect/>
+          </a:stretch>
+        </p:blipFill>
+        <p:spPr>
+          <a:xfrm>
+            <a:off x="616705" y="1037062"/>
+            <a:ext cx="2941113" cy="2557718"/>
+          </a:xfrm>
+          <a:prstGeom prst="rect">
+            <a:avLst/>
+          </a:prstGeom>
+        </p:spPr>
+      </p:pic>
+      <p:pic>
+        <p:nvPicPr>
+          <p:cNvPr id="9" name="Picture 8">
+            <a:extLst>
+              <a:ext uri="{FF2B5EF4-FFF2-40B4-BE49-F238E27FC236}">
+                <a16:creationId xmlns:a16="http://schemas.microsoft.com/office/drawing/2014/main" id="{4B7FDA5D-F031-9678-B5CF-15ACD456B89C}"/>
+              </a:ext>
+            </a:extLst>
+          </p:cNvPr>
+          <p:cNvPicPr>
+            <a:picLocks noChangeAspect="1"/>
+          </p:cNvPicPr>
+          <p:nvPr/>
+        </p:nvPicPr>
+        <p:blipFill>
+          <a:blip r:embed="rId4"/>
+          <a:stretch>
+            <a:fillRect/>
+          </a:stretch>
+        </p:blipFill>
+        <p:spPr>
+          <a:xfrm>
+            <a:off x="4147916" y="856240"/>
+            <a:ext cx="3874594" cy="2880000"/>
+          </a:xfrm>
+          <a:prstGeom prst="rect">
+            <a:avLst/>
+          </a:prstGeom>
+        </p:spPr>
+      </p:pic>
+      <p:cxnSp>
+        <p:nvCxnSpPr>
+          <p:cNvPr id="11" name="Straight Connector 10">
+            <a:extLst>
+              <a:ext uri="{FF2B5EF4-FFF2-40B4-BE49-F238E27FC236}">
+                <a16:creationId xmlns:a16="http://schemas.microsoft.com/office/drawing/2014/main" id="{8D0303B2-AA7C-5592-414C-F2ED2C93408A}"/>
+              </a:ext>
+            </a:extLst>
+          </p:cNvPr>
+          <p:cNvCxnSpPr>
+            <a:cxnSpLocks/>
+          </p:cNvCxnSpPr>
+          <p:nvPr/>
+        </p:nvCxnSpPr>
+        <p:spPr>
+          <a:xfrm flipV="1">
+            <a:off x="5100230" y="1102864"/>
+            <a:ext cx="0" cy="5115056"/>
+          </a:xfrm>
+          <a:prstGeom prst="line">
+            <a:avLst/>
+          </a:prstGeom>
+          <a:ln>
+            <a:solidFill>
+              <a:srgbClr val="FF0000"/>
+            </a:solidFill>
+          </a:ln>
+        </p:spPr>
+        <p:style>
+          <a:lnRef idx="2">
+            <a:schemeClr val="accent1"/>
+          </a:lnRef>
+          <a:fillRef idx="0">
+            <a:schemeClr val="accent1"/>
+          </a:fillRef>
+          <a:effectRef idx="1">
+            <a:schemeClr val="accent1"/>
+          </a:effectRef>
+          <a:fontRef idx="minor">
+            <a:schemeClr val="tx1"/>
+          </a:fontRef>
+        </p:style>
+      </p:cxnSp>
+      <p:pic>
+        <p:nvPicPr>
+          <p:cNvPr id="16" name="Picture 15">
+            <a:extLst>
+              <a:ext uri="{FF2B5EF4-FFF2-40B4-BE49-F238E27FC236}">
+                <a16:creationId xmlns:a16="http://schemas.microsoft.com/office/drawing/2014/main" id="{AC2BBE01-13FF-20C4-394E-F77BC453ACE9}"/>
+              </a:ext>
+            </a:extLst>
+          </p:cNvPr>
+          <p:cNvPicPr>
+            <a:picLocks noChangeAspect="1"/>
+          </p:cNvPicPr>
+          <p:nvPr/>
+        </p:nvPicPr>
+        <p:blipFill>
+          <a:blip r:embed="rId5"/>
+          <a:stretch>
+            <a:fillRect/>
+          </a:stretch>
+        </p:blipFill>
+        <p:spPr>
+          <a:xfrm>
+            <a:off x="616705" y="3594780"/>
+            <a:ext cx="2941113" cy="2557718"/>
+          </a:xfrm>
+          <a:prstGeom prst="rect">
+            <a:avLst/>
+          </a:prstGeom>
+        </p:spPr>
+      </p:pic>
+    </p:spTree>
+    <p:extLst>
+      <p:ext uri="{BB962C8B-B14F-4D97-AF65-F5344CB8AC3E}">
+        <p14:creationId xmlns:p14="http://schemas.microsoft.com/office/powerpoint/2010/main" val="836866364"/>
+      </p:ext>
+    </p:extLst>
+  </p:cSld>
+  <p:clrMapOvr>
+    <a:masterClrMapping/>
+  </p:clrMapOvr>
+</p:sld>
+</file>
+
+<file path=ppt/slides/slide5.xml><?xml version="1.0" encoding="utf-8"?>
 <p:sld xmlns:a="http://schemas.openxmlformats.org/drawingml/2006/main" xmlns:r="http://schemas.openxmlformats.org/officeDocument/2006/relationships" xmlns:p="http://schemas.openxmlformats.org/presentationml/2006/main">
   <p:cSld>
     <p:spTree>

</xml_diff>